<commit_message>
Mise à jour de la présentation et ajout d'une interface
</commit_message>
<xml_diff>
--- a/Présentations/septembre/18-09-2019/Présentation.pptx
+++ b/Présentations/septembre/18-09-2019/Présentation.pptx
@@ -5,7 +5,7 @@
     <p:sldMasterId id="2147483648" r:id="rId1"/>
   </p:sldMasterIdLst>
   <p:notesMasterIdLst>
-    <p:notesMasterId r:id="rId11"/>
+    <p:notesMasterId r:id="rId14"/>
   </p:notesMasterIdLst>
   <p:sldIdLst>
     <p:sldId id="256" r:id="rId2"/>
@@ -14,9 +14,12 @@
     <p:sldId id="278" r:id="rId5"/>
     <p:sldId id="277" r:id="rId6"/>
     <p:sldId id="276" r:id="rId7"/>
-    <p:sldId id="273" r:id="rId8"/>
-    <p:sldId id="279" r:id="rId9"/>
-    <p:sldId id="268" r:id="rId10"/>
+    <p:sldId id="279" r:id="rId8"/>
+    <p:sldId id="280" r:id="rId9"/>
+    <p:sldId id="273" r:id="rId10"/>
+    <p:sldId id="268" r:id="rId11"/>
+    <p:sldId id="281" r:id="rId12"/>
+    <p:sldId id="282" r:id="rId13"/>
   </p:sldIdLst>
   <p:sldSz cx="12192000" cy="6858000"/>
   <p:notesSz cx="6858000" cy="9144000"/>
@@ -548,6 +551,102 @@
     <p:extLst>
       <p:ext uri="{BB962C8B-B14F-4D97-AF65-F5344CB8AC3E}">
         <p14:creationId xmlns:p14="http://schemas.microsoft.com/office/powerpoint/2010/main" val="3058768302"/>
+      </p:ext>
+    </p:extLst>
+  </p:cSld>
+  <p:clrMapOvr>
+    <a:masterClrMapping/>
+  </p:clrMapOvr>
+</p:notes>
+</file>
+
+<file path=ppt/notesSlides/notesSlide2.xml><?xml version="1.0" encoding="utf-8"?>
+<p:notes xmlns:a="http://schemas.openxmlformats.org/drawingml/2006/main" xmlns:r="http://schemas.openxmlformats.org/officeDocument/2006/relationships" xmlns:p="http://schemas.openxmlformats.org/presentationml/2006/main">
+  <p:cSld>
+    <p:spTree>
+      <p:nvGrpSpPr>
+        <p:cNvPr id="1" name=""/>
+        <p:cNvGrpSpPr/>
+        <p:nvPr/>
+      </p:nvGrpSpPr>
+      <p:grpSpPr>
+        <a:xfrm>
+          <a:off x="0" y="0"/>
+          <a:ext cx="0" cy="0"/>
+          <a:chOff x="0" y="0"/>
+          <a:chExt cx="0" cy="0"/>
+        </a:xfrm>
+      </p:grpSpPr>
+      <p:sp>
+        <p:nvSpPr>
+          <p:cNvPr id="2" name="Espace réservé de l'image des diapositives 1"/>
+          <p:cNvSpPr>
+            <a:spLocks noGrp="1" noRot="1" noChangeAspect="1"/>
+          </p:cNvSpPr>
+          <p:nvPr>
+            <p:ph type="sldImg"/>
+          </p:nvPr>
+        </p:nvSpPr>
+        <p:spPr/>
+      </p:sp>
+      <p:sp>
+        <p:nvSpPr>
+          <p:cNvPr id="3" name="Espace réservé des notes 2"/>
+          <p:cNvSpPr>
+            <a:spLocks noGrp="1"/>
+          </p:cNvSpPr>
+          <p:nvPr>
+            <p:ph type="body" idx="1"/>
+          </p:nvPr>
+        </p:nvSpPr>
+        <p:spPr/>
+        <p:txBody>
+          <a:bodyPr/>
+          <a:lstStyle/>
+          <a:p>
+            <a:r>
+              <a:rPr lang="en-CA" dirty="0"/>
+              <a:t>1994 Magellan </a:t>
+            </a:r>
+            <a:r>
+              <a:rPr lang="en-CA" dirty="0" err="1"/>
+              <a:t>Geographix</a:t>
+            </a:r>
+            <a:r>
+              <a:rPr lang="en-CA" dirty="0"/>
+              <a:t> Santa Barbara, CA (800)929-4MAP Robinson Projection</a:t>
+            </a:r>
+            <a:endParaRPr lang="fr-CA" dirty="0"/>
+          </a:p>
+        </p:txBody>
+      </p:sp>
+      <p:sp>
+        <p:nvSpPr>
+          <p:cNvPr id="4" name="Espace réservé du numéro de diapositive 3"/>
+          <p:cNvSpPr>
+            <a:spLocks noGrp="1"/>
+          </p:cNvSpPr>
+          <p:nvPr>
+            <p:ph type="sldNum" sz="quarter" idx="5"/>
+          </p:nvPr>
+        </p:nvSpPr>
+        <p:spPr/>
+        <p:txBody>
+          <a:bodyPr/>
+          <a:lstStyle/>
+          <a:p>
+            <a:fld id="{CDF30879-51EA-4F0B-AB56-EC392D3E121C}" type="slidenum">
+              <a:rPr lang="fr-CA" smtClean="0"/>
+              <a:t>8</a:t>
+            </a:fld>
+            <a:endParaRPr lang="fr-CA"/>
+          </a:p>
+        </p:txBody>
+      </p:sp>
+    </p:spTree>
+    <p:extLst>
+      <p:ext uri="{BB962C8B-B14F-4D97-AF65-F5344CB8AC3E}">
+        <p14:creationId xmlns:p14="http://schemas.microsoft.com/office/powerpoint/2010/main" val="2930110620"/>
       </p:ext>
     </p:extLst>
   </p:cSld>
@@ -4175,6 +4274,1218 @@
 </p:sld>
 </file>
 
+<file path=ppt/slides/slide10.xml><?xml version="1.0" encoding="utf-8"?>
+<p:sld xmlns:a="http://schemas.openxmlformats.org/drawingml/2006/main" xmlns:r="http://schemas.openxmlformats.org/officeDocument/2006/relationships" xmlns:p="http://schemas.openxmlformats.org/presentationml/2006/main">
+  <p:cSld>
+    <p:bg>
+      <p:bgPr>
+        <a:solidFill>
+          <a:schemeClr val="bg1"/>
+        </a:solidFill>
+        <a:effectLst/>
+      </p:bgPr>
+    </p:bg>
+    <p:spTree>
+      <p:nvGrpSpPr>
+        <p:cNvPr id="1" name=""/>
+        <p:cNvGrpSpPr/>
+        <p:nvPr/>
+      </p:nvGrpSpPr>
+      <p:grpSpPr>
+        <a:xfrm>
+          <a:off x="0" y="0"/>
+          <a:ext cx="0" cy="0"/>
+          <a:chOff x="0" y="0"/>
+          <a:chExt cx="0" cy="0"/>
+        </a:xfrm>
+      </p:grpSpPr>
+      <p:pic>
+        <p:nvPicPr>
+          <p:cNvPr id="6" name="Espace réservé du contenu 5">
+            <a:extLst>
+              <a:ext uri="{FF2B5EF4-FFF2-40B4-BE49-F238E27FC236}">
+                <a16:creationId xmlns:a16="http://schemas.microsoft.com/office/drawing/2014/main" id="{0C5BAD85-16AE-4B0A-8D19-2638CA70C242}"/>
+              </a:ext>
+            </a:extLst>
+          </p:cNvPr>
+          <p:cNvPicPr>
+            <a:picLocks noGrp="1" noChangeAspect="1"/>
+          </p:cNvPicPr>
+          <p:nvPr>
+            <p:ph idx="1"/>
+          </p:nvPr>
+        </p:nvPicPr>
+        <p:blipFill>
+          <a:blip r:embed="rId2">
+            <a:extLst>
+              <a:ext uri="{28A0092B-C50C-407E-A947-70E740481C1C}">
+                <a14:useLocalDpi xmlns:a14="http://schemas.microsoft.com/office/drawing/2010/main" val="0"/>
+              </a:ext>
+            </a:extLst>
+          </a:blip>
+          <a:stretch>
+            <a:fillRect/>
+          </a:stretch>
+        </p:blipFill>
+        <p:spPr>
+          <a:xfrm>
+            <a:off x="3239043" y="643466"/>
+            <a:ext cx="5713914" cy="5571067"/>
+          </a:xfrm>
+          <a:prstGeom prst="rect">
+            <a:avLst/>
+          </a:prstGeom>
+        </p:spPr>
+      </p:pic>
+    </p:spTree>
+    <p:extLst>
+      <p:ext uri="{BB962C8B-B14F-4D97-AF65-F5344CB8AC3E}">
+        <p14:creationId xmlns:p14="http://schemas.microsoft.com/office/powerpoint/2010/main" val="3990056866"/>
+      </p:ext>
+    </p:extLst>
+  </p:cSld>
+  <p:clrMapOvr>
+    <a:masterClrMapping/>
+  </p:clrMapOvr>
+</p:sld>
+</file>
+
+<file path=ppt/slides/slide11.xml><?xml version="1.0" encoding="utf-8"?>
+<p:sld xmlns:a="http://schemas.openxmlformats.org/drawingml/2006/main" xmlns:r="http://schemas.openxmlformats.org/officeDocument/2006/relationships" xmlns:p="http://schemas.openxmlformats.org/presentationml/2006/main">
+  <p:cSld>
+    <p:bg>
+      <p:bgPr>
+        <a:solidFill>
+          <a:schemeClr val="bg1"/>
+        </a:solidFill>
+        <a:effectLst/>
+      </p:bgPr>
+    </p:bg>
+    <p:spTree>
+      <p:nvGrpSpPr>
+        <p:cNvPr id="1" name=""/>
+        <p:cNvGrpSpPr/>
+        <p:nvPr/>
+      </p:nvGrpSpPr>
+      <p:grpSpPr>
+        <a:xfrm>
+          <a:off x="0" y="0"/>
+          <a:ext cx="0" cy="0"/>
+          <a:chOff x="0" y="0"/>
+          <a:chExt cx="0" cy="0"/>
+        </a:xfrm>
+      </p:grpSpPr>
+      <p:sp>
+        <p:nvSpPr>
+          <p:cNvPr id="4" name="Rectangle 3">
+            <a:extLst>
+              <a:ext uri="{FF2B5EF4-FFF2-40B4-BE49-F238E27FC236}">
+                <a16:creationId xmlns:a16="http://schemas.microsoft.com/office/drawing/2014/main" id="{4DD5D21D-F3EA-445D-AADB-6D03693C87C0}"/>
+              </a:ext>
+            </a:extLst>
+          </p:cNvPr>
+          <p:cNvSpPr/>
+          <p:nvPr/>
+        </p:nvSpPr>
+        <p:spPr>
+          <a:xfrm>
+            <a:off x="457200" y="314325"/>
+            <a:ext cx="11277600" cy="6229350"/>
+          </a:xfrm>
+          <a:prstGeom prst="rect">
+            <a:avLst/>
+          </a:prstGeom>
+          <a:noFill/>
+          <a:ln>
+            <a:solidFill>
+              <a:schemeClr val="tx1"/>
+            </a:solidFill>
+          </a:ln>
+        </p:spPr>
+        <p:style>
+          <a:lnRef idx="2">
+            <a:schemeClr val="accent1">
+              <a:shade val="50000"/>
+            </a:schemeClr>
+          </a:lnRef>
+          <a:fillRef idx="1">
+            <a:schemeClr val="accent1"/>
+          </a:fillRef>
+          <a:effectRef idx="0">
+            <a:schemeClr val="accent1"/>
+          </a:effectRef>
+          <a:fontRef idx="minor">
+            <a:schemeClr val="lt1"/>
+          </a:fontRef>
+        </p:style>
+        <p:txBody>
+          <a:bodyPr rtlCol="0" anchor="ctr"/>
+          <a:lstStyle/>
+          <a:p>
+            <a:pPr algn="ctr"/>
+            <a:endParaRPr lang="fr-CA"/>
+          </a:p>
+        </p:txBody>
+      </p:sp>
+      <p:sp>
+        <p:nvSpPr>
+          <p:cNvPr id="5" name="Rectangle 4">
+            <a:extLst>
+              <a:ext uri="{FF2B5EF4-FFF2-40B4-BE49-F238E27FC236}">
+                <a16:creationId xmlns:a16="http://schemas.microsoft.com/office/drawing/2014/main" id="{F2252435-55BF-4212-AFD5-F140C9B01DE8}"/>
+              </a:ext>
+            </a:extLst>
+          </p:cNvPr>
+          <p:cNvSpPr/>
+          <p:nvPr/>
+        </p:nvSpPr>
+        <p:spPr>
+          <a:xfrm>
+            <a:off x="457200" y="314325"/>
+            <a:ext cx="11277600" cy="733425"/>
+          </a:xfrm>
+          <a:prstGeom prst="rect">
+            <a:avLst/>
+          </a:prstGeom>
+          <a:noFill/>
+          <a:ln>
+            <a:solidFill>
+              <a:schemeClr val="tx1"/>
+            </a:solidFill>
+          </a:ln>
+        </p:spPr>
+        <p:style>
+          <a:lnRef idx="2">
+            <a:schemeClr val="accent1">
+              <a:shade val="50000"/>
+            </a:schemeClr>
+          </a:lnRef>
+          <a:fillRef idx="1">
+            <a:schemeClr val="accent1"/>
+          </a:fillRef>
+          <a:effectRef idx="0">
+            <a:schemeClr val="accent1"/>
+          </a:effectRef>
+          <a:fontRef idx="minor">
+            <a:schemeClr val="lt1"/>
+          </a:fontRef>
+        </p:style>
+        <p:txBody>
+          <a:bodyPr rtlCol="0" anchor="ctr"/>
+          <a:lstStyle/>
+          <a:p>
+            <a:pPr algn="ctr"/>
+            <a:endParaRPr lang="fr-CA" dirty="0"/>
+          </a:p>
+        </p:txBody>
+      </p:sp>
+      <p:sp>
+        <p:nvSpPr>
+          <p:cNvPr id="7" name="ZoneTexte 6">
+            <a:extLst>
+              <a:ext uri="{FF2B5EF4-FFF2-40B4-BE49-F238E27FC236}">
+                <a16:creationId xmlns:a16="http://schemas.microsoft.com/office/drawing/2014/main" id="{D700CEFB-9D8C-4C37-93C9-A9B38A0C1EEE}"/>
+              </a:ext>
+            </a:extLst>
+          </p:cNvPr>
+          <p:cNvSpPr txBox="1"/>
+          <p:nvPr/>
+        </p:nvSpPr>
+        <p:spPr>
+          <a:xfrm>
+            <a:off x="4848224" y="496371"/>
+            <a:ext cx="2495551" cy="369332"/>
+          </a:xfrm>
+          <a:prstGeom prst="rect">
+            <a:avLst/>
+          </a:prstGeom>
+          <a:noFill/>
+        </p:spPr>
+        <p:txBody>
+          <a:bodyPr wrap="square" rtlCol="0">
+            <a:spAutoFit/>
+          </a:bodyPr>
+          <a:lstStyle/>
+          <a:p>
+            <a:r>
+              <a:rPr lang="en-CA" dirty="0"/>
+              <a:t>Consultation des </a:t>
+            </a:r>
+            <a:r>
+              <a:rPr lang="en-CA" dirty="0" err="1"/>
+              <a:t>bouées</a:t>
+            </a:r>
+            <a:endParaRPr lang="fr-CA" dirty="0"/>
+          </a:p>
+        </p:txBody>
+      </p:sp>
+      <p:pic>
+        <p:nvPicPr>
+          <p:cNvPr id="1026" name="Picture 2" descr="Résultats de recherche d'images pour « logo home »">
+            <a:extLst>
+              <a:ext uri="{FF2B5EF4-FFF2-40B4-BE49-F238E27FC236}">
+                <a16:creationId xmlns:a16="http://schemas.microsoft.com/office/drawing/2014/main" id="{BE53146C-6811-450E-B394-6EF28ABF8786}"/>
+              </a:ext>
+            </a:extLst>
+          </p:cNvPr>
+          <p:cNvPicPr>
+            <a:picLocks noChangeAspect="1" noChangeArrowheads="1"/>
+          </p:cNvPicPr>
+          <p:nvPr/>
+        </p:nvPicPr>
+        <p:blipFill rotWithShape="1">
+          <a:blip r:embed="rId2">
+            <a:extLst>
+              <a:ext uri="{28A0092B-C50C-407E-A947-70E740481C1C}">
+                <a14:useLocalDpi xmlns:a14="http://schemas.microsoft.com/office/drawing/2010/main" val="0"/>
+              </a:ext>
+            </a:extLst>
+          </a:blip>
+          <a:srcRect l="15254" t="12995" r="14689" b="14124"/>
+          <a:stretch/>
+        </p:blipFill>
+        <p:spPr bwMode="auto">
+          <a:xfrm>
+            <a:off x="933450" y="403583"/>
+            <a:ext cx="533400" cy="554908"/>
+          </a:xfrm>
+          <a:prstGeom prst="rect">
+            <a:avLst/>
+          </a:prstGeom>
+          <a:noFill/>
+          <a:extLst>
+            <a:ext uri="{909E8E84-426E-40DD-AFC4-6F175D3DCCD1}">
+              <a14:hiddenFill xmlns:a14="http://schemas.microsoft.com/office/drawing/2010/main">
+                <a:solidFill>
+                  <a:srgbClr val="FFFFFF"/>
+                </a:solidFill>
+              </a14:hiddenFill>
+            </a:ext>
+          </a:extLst>
+        </p:spPr>
+      </p:pic>
+      <p:sp>
+        <p:nvSpPr>
+          <p:cNvPr id="9" name="Bouton d’action : vide 8">
+            <a:hlinkClick r:id="rId3" action="ppaction://hlinksldjump" highlightClick="1"/>
+            <a:extLst>
+              <a:ext uri="{FF2B5EF4-FFF2-40B4-BE49-F238E27FC236}">
+                <a16:creationId xmlns:a16="http://schemas.microsoft.com/office/drawing/2014/main" id="{FC930852-8F4B-4280-9AA8-7D8ADB87FEF9}"/>
+              </a:ext>
+            </a:extLst>
+          </p:cNvPr>
+          <p:cNvSpPr/>
+          <p:nvPr/>
+        </p:nvSpPr>
+        <p:spPr>
+          <a:xfrm>
+            <a:off x="0" y="5295901"/>
+            <a:ext cx="361950" cy="1562100"/>
+          </a:xfrm>
+          <a:prstGeom prst="actionButtonBlank">
+            <a:avLst/>
+          </a:prstGeom>
+          <a:noFill/>
+          <a:ln>
+            <a:solidFill>
+              <a:schemeClr val="bg1"/>
+            </a:solidFill>
+          </a:ln>
+        </p:spPr>
+        <p:style>
+          <a:lnRef idx="2">
+            <a:schemeClr val="accent1">
+              <a:shade val="50000"/>
+            </a:schemeClr>
+          </a:lnRef>
+          <a:fillRef idx="1">
+            <a:schemeClr val="accent1"/>
+          </a:fillRef>
+          <a:effectRef idx="0">
+            <a:schemeClr val="accent1"/>
+          </a:effectRef>
+          <a:fontRef idx="minor">
+            <a:schemeClr val="lt1"/>
+          </a:fontRef>
+        </p:style>
+        <p:txBody>
+          <a:bodyPr rtlCol="0" anchor="ctr"/>
+          <a:lstStyle/>
+          <a:p>
+            <a:pPr algn="ctr"/>
+            <a:endParaRPr lang="fr-CA" dirty="0"/>
+          </a:p>
+        </p:txBody>
+      </p:sp>
+    </p:spTree>
+    <p:extLst>
+      <p:ext uri="{BB962C8B-B14F-4D97-AF65-F5344CB8AC3E}">
+        <p14:creationId xmlns:p14="http://schemas.microsoft.com/office/powerpoint/2010/main" val="1086254278"/>
+      </p:ext>
+    </p:extLst>
+  </p:cSld>
+  <p:clrMapOvr>
+    <a:masterClrMapping/>
+  </p:clrMapOvr>
+</p:sld>
+</file>
+
+<file path=ppt/slides/slide12.xml><?xml version="1.0" encoding="utf-8"?>
+<p:sld xmlns:a="http://schemas.openxmlformats.org/drawingml/2006/main" xmlns:r="http://schemas.openxmlformats.org/officeDocument/2006/relationships" xmlns:p="http://schemas.openxmlformats.org/presentationml/2006/main">
+  <p:cSld>
+    <p:bg>
+      <p:bgPr>
+        <a:solidFill>
+          <a:schemeClr val="bg1"/>
+        </a:solidFill>
+        <a:effectLst/>
+      </p:bgPr>
+    </p:bg>
+    <p:spTree>
+      <p:nvGrpSpPr>
+        <p:cNvPr id="1" name=""/>
+        <p:cNvGrpSpPr/>
+        <p:nvPr/>
+      </p:nvGrpSpPr>
+      <p:grpSpPr>
+        <a:xfrm>
+          <a:off x="0" y="0"/>
+          <a:ext cx="0" cy="0"/>
+          <a:chOff x="0" y="0"/>
+          <a:chExt cx="0" cy="0"/>
+        </a:xfrm>
+      </p:grpSpPr>
+      <p:sp>
+        <p:nvSpPr>
+          <p:cNvPr id="4" name="Rectangle 3">
+            <a:extLst>
+              <a:ext uri="{FF2B5EF4-FFF2-40B4-BE49-F238E27FC236}">
+                <a16:creationId xmlns:a16="http://schemas.microsoft.com/office/drawing/2014/main" id="{4DD5D21D-F3EA-445D-AADB-6D03693C87C0}"/>
+              </a:ext>
+            </a:extLst>
+          </p:cNvPr>
+          <p:cNvSpPr/>
+          <p:nvPr/>
+        </p:nvSpPr>
+        <p:spPr>
+          <a:xfrm>
+            <a:off x="457200" y="314325"/>
+            <a:ext cx="11277600" cy="6229350"/>
+          </a:xfrm>
+          <a:prstGeom prst="rect">
+            <a:avLst/>
+          </a:prstGeom>
+          <a:noFill/>
+          <a:ln>
+            <a:solidFill>
+              <a:schemeClr val="tx1"/>
+            </a:solidFill>
+          </a:ln>
+        </p:spPr>
+        <p:style>
+          <a:lnRef idx="2">
+            <a:schemeClr val="accent1">
+              <a:shade val="50000"/>
+            </a:schemeClr>
+          </a:lnRef>
+          <a:fillRef idx="1">
+            <a:schemeClr val="accent1"/>
+          </a:fillRef>
+          <a:effectRef idx="0">
+            <a:schemeClr val="accent1"/>
+          </a:effectRef>
+          <a:fontRef idx="minor">
+            <a:schemeClr val="lt1"/>
+          </a:fontRef>
+        </p:style>
+        <p:txBody>
+          <a:bodyPr rtlCol="0" anchor="ctr"/>
+          <a:lstStyle/>
+          <a:p>
+            <a:pPr algn="ctr"/>
+            <a:endParaRPr lang="fr-CA"/>
+          </a:p>
+        </p:txBody>
+      </p:sp>
+      <p:sp>
+        <p:nvSpPr>
+          <p:cNvPr id="5" name="Rectangle 4">
+            <a:extLst>
+              <a:ext uri="{FF2B5EF4-FFF2-40B4-BE49-F238E27FC236}">
+                <a16:creationId xmlns:a16="http://schemas.microsoft.com/office/drawing/2014/main" id="{F2252435-55BF-4212-AFD5-F140C9B01DE8}"/>
+              </a:ext>
+            </a:extLst>
+          </p:cNvPr>
+          <p:cNvSpPr/>
+          <p:nvPr/>
+        </p:nvSpPr>
+        <p:spPr>
+          <a:xfrm>
+            <a:off x="457200" y="314325"/>
+            <a:ext cx="11277600" cy="733425"/>
+          </a:xfrm>
+          <a:prstGeom prst="rect">
+            <a:avLst/>
+          </a:prstGeom>
+          <a:noFill/>
+          <a:ln>
+            <a:solidFill>
+              <a:schemeClr val="tx1"/>
+            </a:solidFill>
+          </a:ln>
+        </p:spPr>
+        <p:style>
+          <a:lnRef idx="2">
+            <a:schemeClr val="accent1">
+              <a:shade val="50000"/>
+            </a:schemeClr>
+          </a:lnRef>
+          <a:fillRef idx="1">
+            <a:schemeClr val="accent1"/>
+          </a:fillRef>
+          <a:effectRef idx="0">
+            <a:schemeClr val="accent1"/>
+          </a:effectRef>
+          <a:fontRef idx="minor">
+            <a:schemeClr val="lt1"/>
+          </a:fontRef>
+        </p:style>
+        <p:txBody>
+          <a:bodyPr rtlCol="0" anchor="ctr"/>
+          <a:lstStyle/>
+          <a:p>
+            <a:pPr algn="ctr"/>
+            <a:endParaRPr lang="fr-CA" dirty="0"/>
+          </a:p>
+        </p:txBody>
+      </p:sp>
+      <p:sp>
+        <p:nvSpPr>
+          <p:cNvPr id="7" name="ZoneTexte 6">
+            <a:extLst>
+              <a:ext uri="{FF2B5EF4-FFF2-40B4-BE49-F238E27FC236}">
+                <a16:creationId xmlns:a16="http://schemas.microsoft.com/office/drawing/2014/main" id="{D700CEFB-9D8C-4C37-93C9-A9B38A0C1EEE}"/>
+              </a:ext>
+            </a:extLst>
+          </p:cNvPr>
+          <p:cNvSpPr txBox="1"/>
+          <p:nvPr/>
+        </p:nvSpPr>
+        <p:spPr>
+          <a:xfrm>
+            <a:off x="4848224" y="496371"/>
+            <a:ext cx="2495551" cy="369332"/>
+          </a:xfrm>
+          <a:prstGeom prst="rect">
+            <a:avLst/>
+          </a:prstGeom>
+          <a:noFill/>
+        </p:spPr>
+        <p:txBody>
+          <a:bodyPr wrap="square" rtlCol="0">
+            <a:spAutoFit/>
+          </a:bodyPr>
+          <a:lstStyle/>
+          <a:p>
+            <a:r>
+              <a:rPr lang="en-CA" dirty="0"/>
+              <a:t>Consultation des </a:t>
+            </a:r>
+            <a:r>
+              <a:rPr lang="en-CA" dirty="0" err="1"/>
+              <a:t>bouées</a:t>
+            </a:r>
+            <a:endParaRPr lang="fr-CA" dirty="0"/>
+          </a:p>
+        </p:txBody>
+      </p:sp>
+      <p:pic>
+        <p:nvPicPr>
+          <p:cNvPr id="1026" name="Picture 2" descr="Résultats de recherche d'images pour « logo home »">
+            <a:extLst>
+              <a:ext uri="{FF2B5EF4-FFF2-40B4-BE49-F238E27FC236}">
+                <a16:creationId xmlns:a16="http://schemas.microsoft.com/office/drawing/2014/main" id="{BE53146C-6811-450E-B394-6EF28ABF8786}"/>
+              </a:ext>
+            </a:extLst>
+          </p:cNvPr>
+          <p:cNvPicPr>
+            <a:picLocks noChangeAspect="1" noChangeArrowheads="1"/>
+          </p:cNvPicPr>
+          <p:nvPr/>
+        </p:nvPicPr>
+        <p:blipFill rotWithShape="1">
+          <a:blip r:embed="rId2">
+            <a:extLst>
+              <a:ext uri="{28A0092B-C50C-407E-A947-70E740481C1C}">
+                <a14:useLocalDpi xmlns:a14="http://schemas.microsoft.com/office/drawing/2010/main" val="0"/>
+              </a:ext>
+            </a:extLst>
+          </a:blip>
+          <a:srcRect l="15254" t="12995" r="14689" b="14124"/>
+          <a:stretch/>
+        </p:blipFill>
+        <p:spPr bwMode="auto">
+          <a:xfrm>
+            <a:off x="933450" y="403583"/>
+            <a:ext cx="533400" cy="554908"/>
+          </a:xfrm>
+          <a:prstGeom prst="rect">
+            <a:avLst/>
+          </a:prstGeom>
+          <a:noFill/>
+          <a:extLst>
+            <a:ext uri="{909E8E84-426E-40DD-AFC4-6F175D3DCCD1}">
+              <a14:hiddenFill xmlns:a14="http://schemas.microsoft.com/office/drawing/2010/main">
+                <a:solidFill>
+                  <a:srgbClr val="FFFFFF"/>
+                </a:solidFill>
+              </a14:hiddenFill>
+            </a:ext>
+          </a:extLst>
+        </p:spPr>
+      </p:pic>
+      <p:sp>
+        <p:nvSpPr>
+          <p:cNvPr id="2" name="Rectangle 1">
+            <a:extLst>
+              <a:ext uri="{FF2B5EF4-FFF2-40B4-BE49-F238E27FC236}">
+                <a16:creationId xmlns:a16="http://schemas.microsoft.com/office/drawing/2014/main" id="{4CD12417-177B-4CC0-9DCF-6ABC94D83A76}"/>
+              </a:ext>
+            </a:extLst>
+          </p:cNvPr>
+          <p:cNvSpPr/>
+          <p:nvPr/>
+        </p:nvSpPr>
+        <p:spPr>
+          <a:xfrm>
+            <a:off x="933450" y="1352550"/>
+            <a:ext cx="4667250" cy="2266950"/>
+          </a:xfrm>
+          <a:prstGeom prst="rect">
+            <a:avLst/>
+          </a:prstGeom>
+          <a:noFill/>
+          <a:ln>
+            <a:solidFill>
+              <a:schemeClr val="tx1"/>
+            </a:solidFill>
+          </a:ln>
+        </p:spPr>
+        <p:style>
+          <a:lnRef idx="2">
+            <a:schemeClr val="accent1">
+              <a:shade val="50000"/>
+            </a:schemeClr>
+          </a:lnRef>
+          <a:fillRef idx="1">
+            <a:schemeClr val="accent1"/>
+          </a:fillRef>
+          <a:effectRef idx="0">
+            <a:schemeClr val="accent1"/>
+          </a:effectRef>
+          <a:fontRef idx="minor">
+            <a:schemeClr val="lt1"/>
+          </a:fontRef>
+        </p:style>
+        <p:txBody>
+          <a:bodyPr rtlCol="0" anchor="ctr"/>
+          <a:lstStyle/>
+          <a:p>
+            <a:pPr algn="ctr"/>
+            <a:endParaRPr lang="fr-CA"/>
+          </a:p>
+        </p:txBody>
+      </p:sp>
+      <p:sp>
+        <p:nvSpPr>
+          <p:cNvPr id="8" name="Rectangle 7">
+            <a:extLst>
+              <a:ext uri="{FF2B5EF4-FFF2-40B4-BE49-F238E27FC236}">
+                <a16:creationId xmlns:a16="http://schemas.microsoft.com/office/drawing/2014/main" id="{6D979867-C817-47E7-A7AE-8AC8F4989504}"/>
+              </a:ext>
+            </a:extLst>
+          </p:cNvPr>
+          <p:cNvSpPr/>
+          <p:nvPr/>
+        </p:nvSpPr>
+        <p:spPr>
+          <a:xfrm>
+            <a:off x="6438902" y="1352550"/>
+            <a:ext cx="4667250" cy="2266950"/>
+          </a:xfrm>
+          <a:prstGeom prst="rect">
+            <a:avLst/>
+          </a:prstGeom>
+          <a:noFill/>
+          <a:ln>
+            <a:solidFill>
+              <a:schemeClr val="tx1"/>
+            </a:solidFill>
+          </a:ln>
+        </p:spPr>
+        <p:style>
+          <a:lnRef idx="2">
+            <a:schemeClr val="accent1">
+              <a:shade val="50000"/>
+            </a:schemeClr>
+          </a:lnRef>
+          <a:fillRef idx="1">
+            <a:schemeClr val="accent1"/>
+          </a:fillRef>
+          <a:effectRef idx="0">
+            <a:schemeClr val="accent1"/>
+          </a:effectRef>
+          <a:fontRef idx="minor">
+            <a:schemeClr val="lt1"/>
+          </a:fontRef>
+        </p:style>
+        <p:txBody>
+          <a:bodyPr rtlCol="0" anchor="ctr"/>
+          <a:lstStyle/>
+          <a:p>
+            <a:pPr algn="ctr"/>
+            <a:endParaRPr lang="fr-CA"/>
+          </a:p>
+        </p:txBody>
+      </p:sp>
+      <p:sp>
+        <p:nvSpPr>
+          <p:cNvPr id="9" name="Rectangle 8">
+            <a:extLst>
+              <a:ext uri="{FF2B5EF4-FFF2-40B4-BE49-F238E27FC236}">
+                <a16:creationId xmlns:a16="http://schemas.microsoft.com/office/drawing/2014/main" id="{308C900C-2323-4E8C-A485-5A9027A89FF8}"/>
+              </a:ext>
+            </a:extLst>
+          </p:cNvPr>
+          <p:cNvSpPr/>
+          <p:nvPr/>
+        </p:nvSpPr>
+        <p:spPr>
+          <a:xfrm>
+            <a:off x="933450" y="3948112"/>
+            <a:ext cx="4667250" cy="2266950"/>
+          </a:xfrm>
+          <a:prstGeom prst="rect">
+            <a:avLst/>
+          </a:prstGeom>
+          <a:noFill/>
+          <a:ln>
+            <a:solidFill>
+              <a:schemeClr val="tx1"/>
+            </a:solidFill>
+          </a:ln>
+        </p:spPr>
+        <p:style>
+          <a:lnRef idx="2">
+            <a:schemeClr val="accent1">
+              <a:shade val="50000"/>
+            </a:schemeClr>
+          </a:lnRef>
+          <a:fillRef idx="1">
+            <a:schemeClr val="accent1"/>
+          </a:fillRef>
+          <a:effectRef idx="0">
+            <a:schemeClr val="accent1"/>
+          </a:effectRef>
+          <a:fontRef idx="minor">
+            <a:schemeClr val="lt1"/>
+          </a:fontRef>
+        </p:style>
+        <p:txBody>
+          <a:bodyPr rtlCol="0" anchor="ctr"/>
+          <a:lstStyle/>
+          <a:p>
+            <a:pPr algn="ctr"/>
+            <a:endParaRPr lang="fr-CA"/>
+          </a:p>
+        </p:txBody>
+      </p:sp>
+      <p:sp>
+        <p:nvSpPr>
+          <p:cNvPr id="10" name="Rectangle 9">
+            <a:extLst>
+              <a:ext uri="{FF2B5EF4-FFF2-40B4-BE49-F238E27FC236}">
+                <a16:creationId xmlns:a16="http://schemas.microsoft.com/office/drawing/2014/main" id="{00DF8629-0DB9-4CD8-A982-80B0986DEB30}"/>
+              </a:ext>
+            </a:extLst>
+          </p:cNvPr>
+          <p:cNvSpPr/>
+          <p:nvPr/>
+        </p:nvSpPr>
+        <p:spPr>
+          <a:xfrm>
+            <a:off x="6438902" y="3948112"/>
+            <a:ext cx="4667250" cy="2266950"/>
+          </a:xfrm>
+          <a:prstGeom prst="rect">
+            <a:avLst/>
+          </a:prstGeom>
+          <a:noFill/>
+          <a:ln>
+            <a:solidFill>
+              <a:schemeClr val="tx1"/>
+            </a:solidFill>
+          </a:ln>
+        </p:spPr>
+        <p:style>
+          <a:lnRef idx="2">
+            <a:schemeClr val="accent1">
+              <a:shade val="50000"/>
+            </a:schemeClr>
+          </a:lnRef>
+          <a:fillRef idx="1">
+            <a:schemeClr val="accent1"/>
+          </a:fillRef>
+          <a:effectRef idx="0">
+            <a:schemeClr val="accent1"/>
+          </a:effectRef>
+          <a:fontRef idx="minor">
+            <a:schemeClr val="lt1"/>
+          </a:fontRef>
+        </p:style>
+        <p:txBody>
+          <a:bodyPr rtlCol="0" anchor="ctr"/>
+          <a:lstStyle/>
+          <a:p>
+            <a:pPr algn="ctr"/>
+            <a:endParaRPr lang="fr-CA"/>
+          </a:p>
+        </p:txBody>
+      </p:sp>
+      <p:sp>
+        <p:nvSpPr>
+          <p:cNvPr id="11" name="Rectangle 10">
+            <a:extLst>
+              <a:ext uri="{FF2B5EF4-FFF2-40B4-BE49-F238E27FC236}">
+                <a16:creationId xmlns:a16="http://schemas.microsoft.com/office/drawing/2014/main" id="{FEE24666-57B2-4518-91DC-B6188D31B555}"/>
+              </a:ext>
+            </a:extLst>
+          </p:cNvPr>
+          <p:cNvSpPr/>
+          <p:nvPr/>
+        </p:nvSpPr>
+        <p:spPr>
+          <a:xfrm>
+            <a:off x="933450" y="1352550"/>
+            <a:ext cx="4667250" cy="390525"/>
+          </a:xfrm>
+          <a:prstGeom prst="rect">
+            <a:avLst/>
+          </a:prstGeom>
+          <a:noFill/>
+          <a:ln>
+            <a:solidFill>
+              <a:schemeClr val="tx1"/>
+            </a:solidFill>
+          </a:ln>
+        </p:spPr>
+        <p:style>
+          <a:lnRef idx="2">
+            <a:schemeClr val="accent1">
+              <a:shade val="50000"/>
+            </a:schemeClr>
+          </a:lnRef>
+          <a:fillRef idx="1">
+            <a:schemeClr val="accent1"/>
+          </a:fillRef>
+          <a:effectRef idx="0">
+            <a:schemeClr val="accent1"/>
+          </a:effectRef>
+          <a:fontRef idx="minor">
+            <a:schemeClr val="lt1"/>
+          </a:fontRef>
+        </p:style>
+        <p:txBody>
+          <a:bodyPr rtlCol="0" anchor="ctr"/>
+          <a:lstStyle/>
+          <a:p>
+            <a:pPr algn="ctr"/>
+            <a:endParaRPr lang="fr-CA"/>
+          </a:p>
+        </p:txBody>
+      </p:sp>
+      <p:sp>
+        <p:nvSpPr>
+          <p:cNvPr id="12" name="Rectangle 11">
+            <a:extLst>
+              <a:ext uri="{FF2B5EF4-FFF2-40B4-BE49-F238E27FC236}">
+                <a16:creationId xmlns:a16="http://schemas.microsoft.com/office/drawing/2014/main" id="{56792557-0018-4B2F-8D9C-DB99C8E5192E}"/>
+              </a:ext>
+            </a:extLst>
+          </p:cNvPr>
+          <p:cNvSpPr/>
+          <p:nvPr/>
+        </p:nvSpPr>
+        <p:spPr>
+          <a:xfrm>
+            <a:off x="6438902" y="1352550"/>
+            <a:ext cx="4667250" cy="390525"/>
+          </a:xfrm>
+          <a:prstGeom prst="rect">
+            <a:avLst/>
+          </a:prstGeom>
+          <a:noFill/>
+          <a:ln>
+            <a:solidFill>
+              <a:schemeClr val="tx1"/>
+            </a:solidFill>
+          </a:ln>
+        </p:spPr>
+        <p:style>
+          <a:lnRef idx="2">
+            <a:schemeClr val="accent1">
+              <a:shade val="50000"/>
+            </a:schemeClr>
+          </a:lnRef>
+          <a:fillRef idx="1">
+            <a:schemeClr val="accent1"/>
+          </a:fillRef>
+          <a:effectRef idx="0">
+            <a:schemeClr val="accent1"/>
+          </a:effectRef>
+          <a:fontRef idx="minor">
+            <a:schemeClr val="lt1"/>
+          </a:fontRef>
+        </p:style>
+        <p:txBody>
+          <a:bodyPr rtlCol="0" anchor="ctr"/>
+          <a:lstStyle/>
+          <a:p>
+            <a:pPr algn="ctr"/>
+            <a:endParaRPr lang="fr-CA"/>
+          </a:p>
+        </p:txBody>
+      </p:sp>
+      <p:sp>
+        <p:nvSpPr>
+          <p:cNvPr id="13" name="Rectangle 12">
+            <a:extLst>
+              <a:ext uri="{FF2B5EF4-FFF2-40B4-BE49-F238E27FC236}">
+                <a16:creationId xmlns:a16="http://schemas.microsoft.com/office/drawing/2014/main" id="{5217D0B4-9692-490F-AC42-9EB29881F947}"/>
+              </a:ext>
+            </a:extLst>
+          </p:cNvPr>
+          <p:cNvSpPr/>
+          <p:nvPr/>
+        </p:nvSpPr>
+        <p:spPr>
+          <a:xfrm>
+            <a:off x="933450" y="3948112"/>
+            <a:ext cx="4667250" cy="390525"/>
+          </a:xfrm>
+          <a:prstGeom prst="rect">
+            <a:avLst/>
+          </a:prstGeom>
+          <a:noFill/>
+          <a:ln>
+            <a:solidFill>
+              <a:schemeClr val="tx1"/>
+            </a:solidFill>
+          </a:ln>
+        </p:spPr>
+        <p:style>
+          <a:lnRef idx="2">
+            <a:schemeClr val="accent1">
+              <a:shade val="50000"/>
+            </a:schemeClr>
+          </a:lnRef>
+          <a:fillRef idx="1">
+            <a:schemeClr val="accent1"/>
+          </a:fillRef>
+          <a:effectRef idx="0">
+            <a:schemeClr val="accent1"/>
+          </a:effectRef>
+          <a:fontRef idx="minor">
+            <a:schemeClr val="lt1"/>
+          </a:fontRef>
+        </p:style>
+        <p:txBody>
+          <a:bodyPr rtlCol="0" anchor="ctr"/>
+          <a:lstStyle/>
+          <a:p>
+            <a:pPr algn="ctr"/>
+            <a:endParaRPr lang="fr-CA"/>
+          </a:p>
+        </p:txBody>
+      </p:sp>
+      <p:sp>
+        <p:nvSpPr>
+          <p:cNvPr id="14" name="Rectangle 13">
+            <a:extLst>
+              <a:ext uri="{FF2B5EF4-FFF2-40B4-BE49-F238E27FC236}">
+                <a16:creationId xmlns:a16="http://schemas.microsoft.com/office/drawing/2014/main" id="{716C81F8-746C-4DB4-A947-ED2B465F5DBC}"/>
+              </a:ext>
+            </a:extLst>
+          </p:cNvPr>
+          <p:cNvSpPr/>
+          <p:nvPr/>
+        </p:nvSpPr>
+        <p:spPr>
+          <a:xfrm>
+            <a:off x="6438902" y="3948112"/>
+            <a:ext cx="4667250" cy="390525"/>
+          </a:xfrm>
+          <a:prstGeom prst="rect">
+            <a:avLst/>
+          </a:prstGeom>
+          <a:noFill/>
+          <a:ln>
+            <a:solidFill>
+              <a:schemeClr val="tx1"/>
+            </a:solidFill>
+          </a:ln>
+        </p:spPr>
+        <p:style>
+          <a:lnRef idx="2">
+            <a:schemeClr val="accent1">
+              <a:shade val="50000"/>
+            </a:schemeClr>
+          </a:lnRef>
+          <a:fillRef idx="1">
+            <a:schemeClr val="accent1"/>
+          </a:fillRef>
+          <a:effectRef idx="0">
+            <a:schemeClr val="accent1"/>
+          </a:effectRef>
+          <a:fontRef idx="minor">
+            <a:schemeClr val="lt1"/>
+          </a:fontRef>
+        </p:style>
+        <p:txBody>
+          <a:bodyPr rtlCol="0" anchor="ctr"/>
+          <a:lstStyle/>
+          <a:p>
+            <a:pPr algn="ctr"/>
+            <a:endParaRPr lang="fr-CA"/>
+          </a:p>
+        </p:txBody>
+      </p:sp>
+      <p:sp>
+        <p:nvSpPr>
+          <p:cNvPr id="3" name="ZoneTexte 2">
+            <a:extLst>
+              <a:ext uri="{FF2B5EF4-FFF2-40B4-BE49-F238E27FC236}">
+                <a16:creationId xmlns:a16="http://schemas.microsoft.com/office/drawing/2014/main" id="{3178D38F-C704-478A-BBE9-5E0B14F312B7}"/>
+              </a:ext>
+            </a:extLst>
+          </p:cNvPr>
+          <p:cNvSpPr txBox="1"/>
+          <p:nvPr/>
+        </p:nvSpPr>
+        <p:spPr>
+          <a:xfrm>
+            <a:off x="2414587" y="1357312"/>
+            <a:ext cx="1704975" cy="369332"/>
+          </a:xfrm>
+          <a:prstGeom prst="rect">
+            <a:avLst/>
+          </a:prstGeom>
+          <a:noFill/>
+        </p:spPr>
+        <p:txBody>
+          <a:bodyPr wrap="square" rtlCol="0">
+            <a:spAutoFit/>
+          </a:bodyPr>
+          <a:lstStyle/>
+          <a:p>
+            <a:r>
+              <a:rPr lang="en-CA" dirty="0" err="1"/>
+              <a:t>Atlantique</a:t>
+            </a:r>
+            <a:r>
+              <a:rPr lang="en-CA" dirty="0"/>
+              <a:t> Nord</a:t>
+            </a:r>
+            <a:endParaRPr lang="fr-CA" dirty="0"/>
+          </a:p>
+        </p:txBody>
+      </p:sp>
+      <p:sp>
+        <p:nvSpPr>
+          <p:cNvPr id="15" name="ZoneTexte 14">
+            <a:extLst>
+              <a:ext uri="{FF2B5EF4-FFF2-40B4-BE49-F238E27FC236}">
+                <a16:creationId xmlns:a16="http://schemas.microsoft.com/office/drawing/2014/main" id="{68CFD5A5-62DC-4B83-B2C1-B47695ED0F44}"/>
+              </a:ext>
+            </a:extLst>
+          </p:cNvPr>
+          <p:cNvSpPr txBox="1"/>
+          <p:nvPr/>
+        </p:nvSpPr>
+        <p:spPr>
+          <a:xfrm>
+            <a:off x="2469355" y="3969305"/>
+            <a:ext cx="1595438" cy="369332"/>
+          </a:xfrm>
+          <a:prstGeom prst="rect">
+            <a:avLst/>
+          </a:prstGeom>
+          <a:noFill/>
+        </p:spPr>
+        <p:txBody>
+          <a:bodyPr wrap="square" rtlCol="0">
+            <a:spAutoFit/>
+          </a:bodyPr>
+          <a:lstStyle/>
+          <a:p>
+            <a:r>
+              <a:rPr lang="en-CA" dirty="0" err="1"/>
+              <a:t>Atlantique</a:t>
+            </a:r>
+            <a:r>
+              <a:rPr lang="en-CA" dirty="0"/>
+              <a:t> Sud</a:t>
+            </a:r>
+            <a:endParaRPr lang="fr-CA" dirty="0"/>
+          </a:p>
+        </p:txBody>
+      </p:sp>
+      <p:sp>
+        <p:nvSpPr>
+          <p:cNvPr id="16" name="ZoneTexte 15">
+            <a:extLst>
+              <a:ext uri="{FF2B5EF4-FFF2-40B4-BE49-F238E27FC236}">
+                <a16:creationId xmlns:a16="http://schemas.microsoft.com/office/drawing/2014/main" id="{65141352-424D-40B5-A179-70C7E4B85CBC}"/>
+              </a:ext>
+            </a:extLst>
+          </p:cNvPr>
+          <p:cNvSpPr txBox="1"/>
+          <p:nvPr/>
+        </p:nvSpPr>
+        <p:spPr>
+          <a:xfrm>
+            <a:off x="8072440" y="1343025"/>
+            <a:ext cx="1704975" cy="369332"/>
+          </a:xfrm>
+          <a:prstGeom prst="rect">
+            <a:avLst/>
+          </a:prstGeom>
+          <a:noFill/>
+        </p:spPr>
+        <p:txBody>
+          <a:bodyPr wrap="square" rtlCol="0">
+            <a:spAutoFit/>
+          </a:bodyPr>
+          <a:lstStyle/>
+          <a:p>
+            <a:r>
+              <a:rPr lang="en-CA" dirty="0" err="1"/>
+              <a:t>Pacifique</a:t>
+            </a:r>
+            <a:r>
+              <a:rPr lang="en-CA" dirty="0"/>
+              <a:t> Nord</a:t>
+            </a:r>
+            <a:endParaRPr lang="fr-CA" dirty="0"/>
+          </a:p>
+        </p:txBody>
+      </p:sp>
+      <p:sp>
+        <p:nvSpPr>
+          <p:cNvPr id="17" name="ZoneTexte 16">
+            <a:extLst>
+              <a:ext uri="{FF2B5EF4-FFF2-40B4-BE49-F238E27FC236}">
+                <a16:creationId xmlns:a16="http://schemas.microsoft.com/office/drawing/2014/main" id="{215A09A1-607D-4688-BF6E-D07909E34AF8}"/>
+              </a:ext>
+            </a:extLst>
+          </p:cNvPr>
+          <p:cNvSpPr txBox="1"/>
+          <p:nvPr/>
+        </p:nvSpPr>
+        <p:spPr>
+          <a:xfrm>
+            <a:off x="8127208" y="3948112"/>
+            <a:ext cx="1595438" cy="369332"/>
+          </a:xfrm>
+          <a:prstGeom prst="rect">
+            <a:avLst/>
+          </a:prstGeom>
+          <a:noFill/>
+        </p:spPr>
+        <p:txBody>
+          <a:bodyPr wrap="square" rtlCol="0">
+            <a:spAutoFit/>
+          </a:bodyPr>
+          <a:lstStyle/>
+          <a:p>
+            <a:r>
+              <a:rPr lang="en-CA" dirty="0" err="1"/>
+              <a:t>Pacifique</a:t>
+            </a:r>
+            <a:r>
+              <a:rPr lang="en-CA" dirty="0"/>
+              <a:t> Sud</a:t>
+            </a:r>
+            <a:endParaRPr lang="fr-CA" dirty="0"/>
+          </a:p>
+        </p:txBody>
+      </p:sp>
+      <p:sp>
+        <p:nvSpPr>
+          <p:cNvPr id="18" name="Bouton d’action : vide 17">
+            <a:hlinkClick r:id="rId3" action="ppaction://hlinksldjump" highlightClick="1"/>
+            <a:extLst>
+              <a:ext uri="{FF2B5EF4-FFF2-40B4-BE49-F238E27FC236}">
+                <a16:creationId xmlns:a16="http://schemas.microsoft.com/office/drawing/2014/main" id="{CCDD264B-BB32-4734-AF52-4F2E1C3C6A71}"/>
+              </a:ext>
+            </a:extLst>
+          </p:cNvPr>
+          <p:cNvSpPr/>
+          <p:nvPr/>
+        </p:nvSpPr>
+        <p:spPr>
+          <a:xfrm>
+            <a:off x="0" y="5295901"/>
+            <a:ext cx="361950" cy="1562100"/>
+          </a:xfrm>
+          <a:prstGeom prst="actionButtonBlank">
+            <a:avLst/>
+          </a:prstGeom>
+          <a:noFill/>
+          <a:ln>
+            <a:solidFill>
+              <a:schemeClr val="bg1"/>
+            </a:solidFill>
+          </a:ln>
+        </p:spPr>
+        <p:style>
+          <a:lnRef idx="2">
+            <a:schemeClr val="accent1">
+              <a:shade val="50000"/>
+            </a:schemeClr>
+          </a:lnRef>
+          <a:fillRef idx="1">
+            <a:schemeClr val="accent1"/>
+          </a:fillRef>
+          <a:effectRef idx="0">
+            <a:schemeClr val="accent1"/>
+          </a:effectRef>
+          <a:fontRef idx="minor">
+            <a:schemeClr val="lt1"/>
+          </a:fontRef>
+        </p:style>
+        <p:txBody>
+          <a:bodyPr rtlCol="0" anchor="ctr"/>
+          <a:lstStyle/>
+          <a:p>
+            <a:pPr algn="ctr"/>
+            <a:endParaRPr lang="fr-CA" dirty="0"/>
+          </a:p>
+        </p:txBody>
+      </p:sp>
+    </p:spTree>
+    <p:extLst>
+      <p:ext uri="{BB962C8B-B14F-4D97-AF65-F5344CB8AC3E}">
+        <p14:creationId xmlns:p14="http://schemas.microsoft.com/office/powerpoint/2010/main" val="280098812"/>
+      </p:ext>
+    </p:extLst>
+  </p:cSld>
+  <p:clrMapOvr>
+    <a:masterClrMapping/>
+  </p:clrMapOvr>
+</p:sld>
+</file>
+
 <file path=ppt/slides/slide2.xml><?xml version="1.0" encoding="utf-8"?>
 <p:sld xmlns:a="http://schemas.openxmlformats.org/drawingml/2006/main" xmlns:r="http://schemas.openxmlformats.org/officeDocument/2006/relationships" xmlns:p="http://schemas.openxmlformats.org/presentationml/2006/main">
   <p:cSld>
@@ -4221,7 +5532,7 @@
         </p:nvSpPr>
         <p:spPr>
           <a:xfrm>
-            <a:off x="801099" y="1396289"/>
+            <a:off x="805543" y="377114"/>
             <a:ext cx="5006336" cy="1325563"/>
           </a:xfrm>
         </p:spPr>
@@ -4256,8 +5567,8 @@
         </p:nvSpPr>
         <p:spPr>
           <a:xfrm>
-            <a:off x="985421" y="2871982"/>
-            <a:ext cx="4826458" cy="3181684"/>
+            <a:off x="985421" y="1885950"/>
+            <a:ext cx="4826458" cy="4167716"/>
           </a:xfrm>
         </p:spPr>
         <p:txBody>
@@ -4299,19 +5610,19 @@
           </a:p>
           <a:p>
             <a:r>
+              <a:rPr lang="en-US" sz="2400" dirty="0"/>
+              <a:t>Questions</a:t>
+            </a:r>
+          </a:p>
+          <a:p>
+            <a:endParaRPr lang="en-US" sz="2400" dirty="0"/>
+          </a:p>
+          <a:p>
+            <a:r>
               <a:rPr lang="en-US" sz="2400" dirty="0" err="1"/>
               <a:t>Démonstration</a:t>
             </a:r>
             <a:endParaRPr lang="en-US" sz="2400" dirty="0"/>
-          </a:p>
-          <a:p>
-            <a:endParaRPr lang="en-US" sz="2400" dirty="0"/>
-          </a:p>
-          <a:p>
-            <a:r>
-              <a:rPr lang="en-US" sz="2400" dirty="0"/>
-              <a:t>Questions</a:t>
-            </a:r>
           </a:p>
         </p:txBody>
       </p:sp>
@@ -5806,8 +7117,8 @@
         </p:nvSpPr>
         <p:spPr>
           <a:xfrm>
-            <a:off x="420099" y="3225089"/>
-            <a:ext cx="6172782" cy="1325563"/>
+            <a:off x="1085849" y="3225089"/>
+            <a:ext cx="5507031" cy="1325563"/>
           </a:xfrm>
         </p:spPr>
         <p:txBody>
@@ -5817,18 +7128,9 @@
           <a:lstStyle/>
           <a:p>
             <a:r>
-              <a:rPr lang="fr-FR" dirty="0">
-                <a:hlinkClick r:id="rId2">
-                  <a:extLst>
-                    <a:ext uri="{A12FA001-AC4F-418D-AE19-62706E023703}">
-                      <ahyp:hlinkClr xmlns:ahyp="http://schemas.microsoft.com/office/drawing/2018/hyperlinkcolor" val="tx"/>
-                    </a:ext>
-                  </a:extLst>
-                </a:hlinkClick>
-              </a:rPr>
-              <a:t>Démonstration</a:t>
-            </a:r>
-            <a:endParaRPr lang="fr-FR" dirty="0"/>
+              <a:rPr lang="fr-FR" dirty="0"/>
+              <a:t>Questions</a:t>
+            </a:r>
           </a:p>
         </p:txBody>
       </p:sp>
@@ -6014,7 +7316,7 @@
           <p:nvPr/>
         </p:nvPicPr>
         <p:blipFill rotWithShape="1">
-          <a:blip r:embed="rId3">
+          <a:blip r:embed="rId2">
             <a:extLst>
               <a:ext uri="{28A0092B-C50C-407E-A947-70E740481C1C}">
                 <a14:useLocalDpi xmlns:a14="http://schemas.microsoft.com/office/drawing/2010/main" val="0"/>
@@ -6108,7 +7410,7 @@
     </p:spTree>
     <p:extLst>
       <p:ext uri="{BB962C8B-B14F-4D97-AF65-F5344CB8AC3E}">
-        <p14:creationId xmlns:p14="http://schemas.microsoft.com/office/powerpoint/2010/main" val="2461392252"/>
+        <p14:creationId xmlns:p14="http://schemas.microsoft.com/office/powerpoint/2010/main" val="3377858594"/>
       </p:ext>
     </p:extLst>
   </p:cSld>
@@ -6119,6 +7421,124 @@
 </file>
 
 <file path=ppt/slides/slide8.xml><?xml version="1.0" encoding="utf-8"?>
+<p:sld xmlns:a="http://schemas.openxmlformats.org/drawingml/2006/main" xmlns:r="http://schemas.openxmlformats.org/officeDocument/2006/relationships" xmlns:p="http://schemas.openxmlformats.org/presentationml/2006/main">
+  <p:cSld>
+    <p:spTree>
+      <p:nvGrpSpPr>
+        <p:cNvPr id="1" name=""/>
+        <p:cNvGrpSpPr/>
+        <p:nvPr/>
+      </p:nvGrpSpPr>
+      <p:grpSpPr>
+        <a:xfrm>
+          <a:off x="0" y="0"/>
+          <a:ext cx="0" cy="0"/>
+          <a:chOff x="0" y="0"/>
+          <a:chExt cx="0" cy="0"/>
+        </a:xfrm>
+      </p:grpSpPr>
+      <p:pic>
+        <p:nvPicPr>
+          <p:cNvPr id="3" name="Image 2">
+            <a:extLst>
+              <a:ext uri="{FF2B5EF4-FFF2-40B4-BE49-F238E27FC236}">
+                <a16:creationId xmlns:a16="http://schemas.microsoft.com/office/drawing/2014/main" id="{660B921A-5B53-4579-838F-8C4BA71ED4F2}"/>
+              </a:ext>
+            </a:extLst>
+          </p:cNvPr>
+          <p:cNvPicPr>
+            <a:picLocks noChangeAspect="1"/>
+          </p:cNvPicPr>
+          <p:nvPr/>
+        </p:nvPicPr>
+        <p:blipFill rotWithShape="1">
+          <a:blip r:embed="rId3">
+            <a:extLst>
+              <a:ext uri="{28A0092B-C50C-407E-A947-70E740481C1C}">
+                <a14:useLocalDpi xmlns:a14="http://schemas.microsoft.com/office/drawing/2010/main" val="0"/>
+              </a:ext>
+            </a:extLst>
+          </a:blip>
+          <a:srcRect b="6187"/>
+          <a:stretch/>
+        </p:blipFill>
+        <p:spPr>
+          <a:xfrm>
+            <a:off x="0" y="237173"/>
+            <a:ext cx="12192000" cy="6383655"/>
+          </a:xfrm>
+          <a:prstGeom prst="rect">
+            <a:avLst/>
+          </a:prstGeom>
+        </p:spPr>
+      </p:pic>
+      <p:sp>
+        <p:nvSpPr>
+          <p:cNvPr id="4" name="Bouton d’action : vide 3">
+            <a:hlinkClick r:id="rId4" action="ppaction://hlinksldjump" highlightClick="1"/>
+            <a:extLst>
+              <a:ext uri="{FF2B5EF4-FFF2-40B4-BE49-F238E27FC236}">
+                <a16:creationId xmlns:a16="http://schemas.microsoft.com/office/drawing/2014/main" id="{B88DC8D6-31FF-49E9-B8FB-66BB464466B5}"/>
+              </a:ext>
+            </a:extLst>
+          </p:cNvPr>
+          <p:cNvSpPr/>
+          <p:nvPr/>
+        </p:nvSpPr>
+        <p:spPr>
+          <a:xfrm>
+            <a:off x="0" y="5934075"/>
+            <a:ext cx="1314450" cy="923925"/>
+          </a:xfrm>
+          <a:prstGeom prst="actionButtonBlank">
+            <a:avLst/>
+          </a:prstGeom>
+          <a:noFill/>
+          <a:ln>
+            <a:solidFill>
+              <a:schemeClr val="bg1"/>
+            </a:solidFill>
+          </a:ln>
+        </p:spPr>
+        <p:style>
+          <a:lnRef idx="2">
+            <a:schemeClr val="accent1">
+              <a:shade val="50000"/>
+            </a:schemeClr>
+          </a:lnRef>
+          <a:fillRef idx="1">
+            <a:schemeClr val="accent1"/>
+          </a:fillRef>
+          <a:effectRef idx="0">
+            <a:schemeClr val="accent1"/>
+          </a:effectRef>
+          <a:fontRef idx="minor">
+            <a:schemeClr val="lt1"/>
+          </a:fontRef>
+        </p:style>
+        <p:txBody>
+          <a:bodyPr rtlCol="0" anchor="ctr"/>
+          <a:lstStyle/>
+          <a:p>
+            <a:pPr algn="ctr"/>
+            <a:endParaRPr lang="fr-CA"/>
+          </a:p>
+        </p:txBody>
+      </p:sp>
+    </p:spTree>
+    <p:extLst>
+      <p:ext uri="{BB962C8B-B14F-4D97-AF65-F5344CB8AC3E}">
+        <p14:creationId xmlns:p14="http://schemas.microsoft.com/office/powerpoint/2010/main" val="3985844982"/>
+      </p:ext>
+    </p:extLst>
+  </p:cSld>
+  <p:clrMapOvr>
+    <a:masterClrMapping/>
+  </p:clrMapOvr>
+</p:sld>
+</file>
+
+<file path=ppt/slides/slide9.xml><?xml version="1.0" encoding="utf-8"?>
 <p:sld xmlns:a="http://schemas.openxmlformats.org/drawingml/2006/main" xmlns:r="http://schemas.openxmlformats.org/officeDocument/2006/relationships" xmlns:p="http://schemas.openxmlformats.org/presentationml/2006/main">
   <p:cSld>
     <p:bg>
@@ -6164,8 +7584,8 @@
         </p:nvSpPr>
         <p:spPr>
           <a:xfrm>
-            <a:off x="1085849" y="3225089"/>
-            <a:ext cx="5507031" cy="1325563"/>
+            <a:off x="420099" y="3225089"/>
+            <a:ext cx="6172782" cy="1325563"/>
           </a:xfrm>
         </p:spPr>
         <p:txBody>
@@ -6175,9 +7595,18 @@
           <a:lstStyle/>
           <a:p>
             <a:r>
-              <a:rPr lang="fr-FR" dirty="0"/>
-              <a:t>Questions</a:t>
-            </a:r>
+              <a:rPr lang="fr-FR" dirty="0">
+                <a:hlinkClick r:id="rId2">
+                  <a:extLst>
+                    <a:ext uri="{A12FA001-AC4F-418D-AE19-62706E023703}">
+                      <ahyp:hlinkClr xmlns:ahyp="http://schemas.microsoft.com/office/drawing/2018/hyperlinkcolor" val="tx"/>
+                    </a:ext>
+                  </a:extLst>
+                </a:hlinkClick>
+              </a:rPr>
+              <a:t>Démonstration</a:t>
+            </a:r>
+            <a:endParaRPr lang="fr-FR" dirty="0"/>
           </a:p>
         </p:txBody>
       </p:sp>
@@ -6363,7 +7792,7 @@
           <p:nvPr/>
         </p:nvPicPr>
         <p:blipFill rotWithShape="1">
-          <a:blip r:embed="rId2">
+          <a:blip r:embed="rId3">
             <a:extLst>
               <a:ext uri="{28A0092B-C50C-407E-A947-70E740481C1C}">
                 <a14:useLocalDpi xmlns:a14="http://schemas.microsoft.com/office/drawing/2010/main" val="0"/>
@@ -6457,88 +7886,12 @@
     </p:spTree>
     <p:extLst>
       <p:ext uri="{BB962C8B-B14F-4D97-AF65-F5344CB8AC3E}">
-        <p14:creationId xmlns:p14="http://schemas.microsoft.com/office/powerpoint/2010/main" val="3377858594"/>
+        <p14:creationId xmlns:p14="http://schemas.microsoft.com/office/powerpoint/2010/main" val="2461392252"/>
       </p:ext>
     </p:extLst>
   </p:cSld>
   <p:clrMapOvr>
     <a:overrideClrMapping bg1="dk1" tx1="lt1" bg2="dk2" tx2="lt2" accent1="accent1" accent2="accent2" accent3="accent3" accent4="accent4" accent5="accent5" accent6="accent6" hlink="hlink" folHlink="folHlink"/>
-  </p:clrMapOvr>
-</p:sld>
-</file>
-
-<file path=ppt/slides/slide9.xml><?xml version="1.0" encoding="utf-8"?>
-<p:sld xmlns:a="http://schemas.openxmlformats.org/drawingml/2006/main" xmlns:r="http://schemas.openxmlformats.org/officeDocument/2006/relationships" xmlns:p="http://schemas.openxmlformats.org/presentationml/2006/main">
-  <p:cSld>
-    <p:bg>
-      <p:bgPr>
-        <a:solidFill>
-          <a:schemeClr val="bg1"/>
-        </a:solidFill>
-        <a:effectLst/>
-      </p:bgPr>
-    </p:bg>
-    <p:spTree>
-      <p:nvGrpSpPr>
-        <p:cNvPr id="1" name=""/>
-        <p:cNvGrpSpPr/>
-        <p:nvPr/>
-      </p:nvGrpSpPr>
-      <p:grpSpPr>
-        <a:xfrm>
-          <a:off x="0" y="0"/>
-          <a:ext cx="0" cy="0"/>
-          <a:chOff x="0" y="0"/>
-          <a:chExt cx="0" cy="0"/>
-        </a:xfrm>
-      </p:grpSpPr>
-      <p:pic>
-        <p:nvPicPr>
-          <p:cNvPr id="6" name="Espace réservé du contenu 5">
-            <a:extLst>
-              <a:ext uri="{FF2B5EF4-FFF2-40B4-BE49-F238E27FC236}">
-                <a16:creationId xmlns:a16="http://schemas.microsoft.com/office/drawing/2014/main" id="{0C5BAD85-16AE-4B0A-8D19-2638CA70C242}"/>
-              </a:ext>
-            </a:extLst>
-          </p:cNvPr>
-          <p:cNvPicPr>
-            <a:picLocks noGrp="1" noChangeAspect="1"/>
-          </p:cNvPicPr>
-          <p:nvPr>
-            <p:ph idx="1"/>
-          </p:nvPr>
-        </p:nvPicPr>
-        <p:blipFill>
-          <a:blip r:embed="rId2">
-            <a:extLst>
-              <a:ext uri="{28A0092B-C50C-407E-A947-70E740481C1C}">
-                <a14:useLocalDpi xmlns:a14="http://schemas.microsoft.com/office/drawing/2010/main" val="0"/>
-              </a:ext>
-            </a:extLst>
-          </a:blip>
-          <a:stretch>
-            <a:fillRect/>
-          </a:stretch>
-        </p:blipFill>
-        <p:spPr>
-          <a:xfrm>
-            <a:off x="3239043" y="643466"/>
-            <a:ext cx="5713914" cy="5571067"/>
-          </a:xfrm>
-          <a:prstGeom prst="rect">
-            <a:avLst/>
-          </a:prstGeom>
-        </p:spPr>
-      </p:pic>
-    </p:spTree>
-    <p:extLst>
-      <p:ext uri="{BB962C8B-B14F-4D97-AF65-F5344CB8AC3E}">
-        <p14:creationId xmlns:p14="http://schemas.microsoft.com/office/powerpoint/2010/main" val="3990056866"/>
-      </p:ext>
-    </p:extLst>
-  </p:cSld>
-  <p:clrMapOvr>
-    <a:masterClrMapping/>
   </p:clrMapOvr>
 </p:sld>
 </file>

</xml_diff>